<commit_message>
added one hot encoding image
</commit_message>
<xml_diff>
--- a/notebooks/figure_prep/figures-5.1-pretty-plots.pptx
+++ b/notebooks/figure_prep/figures-5.1-pretty-plots.pptx
@@ -3692,8 +3692,8 @@
         </p:nvSpPr>
         <p:spPr>
           <a:xfrm>
-            <a:off x="1" y="0"/>
-            <a:ext cx="12192000" cy="6857999"/>
+            <a:off x="1" y="1062032"/>
+            <a:ext cx="12192000" cy="5194929"/>
           </a:xfrm>
           <a:prstGeom prst="rect">
             <a:avLst/>
@@ -3830,7 +3830,7 @@
                 <a:latin typeface="Arial" panose="020B0604020202020204" pitchFamily="34" charset="0"/>
                 <a:cs typeface="Arial" panose="020B0604020202020204" pitchFamily="34" charset="0"/>
               </a:rPr>
-              <a:t>Decent</a:t>
+              <a:t>Before</a:t>
             </a:r>
             <a:endParaRPr lang="en-US" sz="2000" b="1" dirty="0">
               <a:solidFill>
@@ -3885,7 +3885,7 @@
                 <a:latin typeface="Arial" panose="020B0604020202020204" pitchFamily="34" charset="0"/>
                 <a:cs typeface="Arial" panose="020B0604020202020204" pitchFamily="34" charset="0"/>
               </a:rPr>
-              <a:t>Great</a:t>
+              <a:t>After</a:t>
             </a:r>
             <a:endParaRPr lang="en-US" sz="2000" b="1" dirty="0">
               <a:solidFill>

</xml_diff>